<commit_message>
* Updated doc and README * Dos2Unix on source files
</commit_message>
<xml_diff>
--- a/src/doc/Architecture.pptx
+++ b/src/doc/Architecture.pptx
@@ -3340,8 +3340,8 @@
         </p:nvSpPr>
         <p:spPr>
           <a:xfrm>
-            <a:off x="1970482" y="709612"/>
-            <a:ext cx="8711806" cy="5705476"/>
+            <a:off x="1387011" y="709612"/>
+            <a:ext cx="9295277" cy="5705476"/>
           </a:xfrm>
           <a:prstGeom prst="rect">
             <a:avLst/>
@@ -3394,8 +3394,8 @@
         </p:nvSpPr>
         <p:spPr>
           <a:xfrm>
-            <a:off x="2402459" y="1946953"/>
-            <a:ext cx="7945288" cy="3242310"/>
+            <a:off x="1736335" y="1946953"/>
+            <a:ext cx="8611412" cy="3242310"/>
           </a:xfrm>
           <a:prstGeom prst="rect">
             <a:avLst/>
@@ -3449,7 +3449,7 @@
         </p:nvSpPr>
         <p:spPr>
           <a:xfrm>
-            <a:off x="2781300" y="2377702"/>
+            <a:off x="2169997" y="2377702"/>
             <a:ext cx="2847520" cy="2537197"/>
           </a:xfrm>
           <a:prstGeom prst="rect">
@@ -3988,7 +3988,7 @@
         </p:nvSpPr>
         <p:spPr>
           <a:xfrm>
-            <a:off x="3156393" y="2929052"/>
+            <a:off x="2545090" y="2929052"/>
             <a:ext cx="2091072" cy="1578346"/>
           </a:xfrm>
           <a:prstGeom prst="roundRect">
@@ -4050,7 +4050,7 @@
         </p:blipFill>
         <p:spPr>
           <a:xfrm>
-            <a:off x="2857768" y="2727891"/>
+            <a:off x="2246465" y="2727891"/>
             <a:ext cx="555442" cy="461665"/>
           </a:xfrm>
           <a:prstGeom prst="rect">
@@ -4072,7 +4072,7 @@
         </p:nvSpPr>
         <p:spPr>
           <a:xfrm>
-            <a:off x="3606884" y="3370463"/>
+            <a:off x="2995581" y="3370463"/>
             <a:ext cx="1218851" cy="851766"/>
           </a:xfrm>
           <a:prstGeom prst="roundRect">
@@ -4154,7 +4154,7 @@
         </p:blipFill>
         <p:spPr bwMode="auto">
           <a:xfrm>
-            <a:off x="3419593" y="3230182"/>
+            <a:off x="2808290" y="3230182"/>
             <a:ext cx="480052" cy="419172"/>
           </a:xfrm>
           <a:prstGeom prst="rect">
@@ -4186,7 +4186,7 @@
         </p:nvSpPr>
         <p:spPr>
           <a:xfrm>
-            <a:off x="3268424" y="4287981"/>
+            <a:off x="2657121" y="4287981"/>
             <a:ext cx="1864954" cy="230832"/>
           </a:xfrm>
           <a:prstGeom prst="rect">
@@ -4222,7 +4222,7 @@
         </p:nvSpPr>
         <p:spPr>
           <a:xfrm>
-            <a:off x="2983783" y="2902078"/>
+            <a:off x="2372480" y="2902078"/>
             <a:ext cx="2436291" cy="338554"/>
           </a:xfrm>
           <a:prstGeom prst="rect">
@@ -4277,7 +4277,7 @@
         </p:blipFill>
         <p:spPr bwMode="auto">
           <a:xfrm>
-            <a:off x="3915676" y="3968679"/>
+            <a:off x="3304373" y="3968679"/>
             <a:ext cx="601265" cy="146462"/>
           </a:xfrm>
           <a:prstGeom prst="rect">
@@ -4670,15 +4670,7 @@
           <a:p>
             <a:r>
               <a:rPr lang="en-US" sz="1100" b="1" i="1" dirty="0"/>
-              <a:t>&lt;</a:t>
-            </a:r>
-            <a:r>
-              <a:rPr lang="en-US" sz="1100" b="1" i="1" dirty="0" err="1"/>
-              <a:t>caenvsysname</a:t>
-            </a:r>
-            <a:r>
-              <a:rPr lang="en-US" sz="1100" b="1" i="1" dirty="0"/>
-              <a:t>&gt;.&lt;region&gt;.azurecontainerapps.io</a:t>
+              <a:t>&lt;env&gt;.&lt;region&gt;.azurecontainerapps.io</a:t>
             </a:r>
           </a:p>
         </p:txBody>
@@ -4897,7 +4889,7 @@
         </p:nvGrpSpPr>
         <p:grpSpPr>
           <a:xfrm>
-            <a:off x="2612929" y="2288441"/>
+            <a:off x="2001626" y="2288441"/>
             <a:ext cx="319355" cy="302034"/>
             <a:chOff x="5625017" y="2130163"/>
             <a:chExt cx="406355" cy="317593"/>
@@ -5008,7 +5000,7 @@
         </p:nvSpPr>
         <p:spPr>
           <a:xfrm>
-            <a:off x="5073414" y="4665162"/>
+            <a:off x="4462111" y="4665162"/>
             <a:ext cx="614342" cy="230832"/>
           </a:xfrm>
           <a:prstGeom prst="rect">
@@ -5045,7 +5037,7 @@
         </p:nvSpPr>
         <p:spPr>
           <a:xfrm>
-            <a:off x="2770196" y="2366287"/>
+            <a:off x="2158893" y="2366287"/>
             <a:ext cx="2693009" cy="253916"/>
           </a:xfrm>
           <a:prstGeom prst="rect">
@@ -5097,7 +5089,7 @@
         </p:nvGrpSpPr>
         <p:grpSpPr>
           <a:xfrm>
-            <a:off x="2242781" y="1839876"/>
+            <a:off x="1529130" y="1837633"/>
             <a:ext cx="319355" cy="302034"/>
             <a:chOff x="2003549" y="1747260"/>
             <a:chExt cx="319355" cy="302034"/>
@@ -5245,7 +5237,7 @@
         </p:nvSpPr>
         <p:spPr>
           <a:xfrm>
-            <a:off x="2132726" y="2012709"/>
+            <a:off x="1521423" y="2012709"/>
             <a:ext cx="2693009" cy="253916"/>
           </a:xfrm>
           <a:prstGeom prst="rect">
@@ -5292,8 +5284,8 @@
         </p:nvCxnSpPr>
         <p:spPr>
           <a:xfrm>
-            <a:off x="4825735" y="3796346"/>
-            <a:ext cx="2633878" cy="553"/>
+            <a:off x="4214432" y="3796346"/>
+            <a:ext cx="3245181" cy="553"/>
           </a:xfrm>
           <a:prstGeom prst="straightConnector1">
             <a:avLst/>
@@ -5331,8 +5323,8 @@
         </p:nvSpPr>
         <p:spPr>
           <a:xfrm>
-            <a:off x="5244037" y="3583229"/>
-            <a:ext cx="1864954" cy="230832"/>
+            <a:off x="4166117" y="3557227"/>
+            <a:ext cx="3393348" cy="646331"/>
           </a:xfrm>
           <a:prstGeom prst="rect">
             <a:avLst/>
@@ -5347,8 +5339,19 @@
           <a:p>
             <a:pPr algn="ctr"/>
             <a:r>
-              <a:rPr lang="fr-FR" sz="900" i="1" dirty="0"/>
-              <a:t>http GET </a:t>
+              <a:rPr lang="fr-FR" sz="900" b="1" i="1" dirty="0"/>
+              <a:t>HTTP GET </a:t>
+            </a:r>
+          </a:p>
+          <a:p>
+            <a:pPr algn="ctr"/>
+            <a:endParaRPr lang="fr-FR" sz="900" b="1" i="1" dirty="0"/>
+          </a:p>
+          <a:p>
+            <a:pPr algn="ctr"/>
+            <a:r>
+              <a:rPr lang="fr-FR" sz="900" b="1" i="1" dirty="0"/>
+              <a:t>http://helloer.&lt;env&gt;.&lt;region&gt;.azurecontainerapps.io/connectivity/private </a:t>
             </a:r>
           </a:p>
         </p:txBody>
@@ -5367,8 +5370,8 @@
         </p:nvSpPr>
         <p:spPr>
           <a:xfrm>
-            <a:off x="2423796" y="5516663"/>
-            <a:ext cx="7923951" cy="597517"/>
+            <a:off x="1796113" y="5499793"/>
+            <a:ext cx="8551634" cy="597517"/>
           </a:xfrm>
           <a:prstGeom prst="roundRect">
             <a:avLst>
@@ -5438,7 +5441,7 @@
         </p:blipFill>
         <p:spPr>
           <a:xfrm>
-            <a:off x="2323571" y="5389531"/>
+            <a:off x="1712268" y="5389531"/>
             <a:ext cx="308385" cy="308385"/>
           </a:xfrm>
           <a:prstGeom prst="rect">
@@ -5496,7 +5499,7 @@
         </p:nvSpPr>
         <p:spPr>
           <a:xfrm>
-            <a:off x="2570267" y="5538496"/>
+            <a:off x="1958964" y="5538496"/>
             <a:ext cx="1231380" cy="253916"/>
           </a:xfrm>
           <a:prstGeom prst="rect">
@@ -5550,7 +5553,7 @@
         </p:blipFill>
         <p:spPr>
           <a:xfrm>
-            <a:off x="4122957" y="4805695"/>
+            <a:off x="3511654" y="4805695"/>
             <a:ext cx="206499" cy="206499"/>
           </a:xfrm>
           <a:prstGeom prst="rect">
@@ -5613,7 +5616,7 @@
         </p:nvCxnSpPr>
         <p:spPr>
           <a:xfrm flipH="1">
-            <a:off x="4226206" y="5012194"/>
+            <a:off x="3614903" y="5012194"/>
             <a:ext cx="1" cy="504332"/>
           </a:xfrm>
           <a:prstGeom prst="straightConnector1">
@@ -5710,7 +5713,7 @@
         </p:blipFill>
         <p:spPr>
           <a:xfrm>
-            <a:off x="1796113" y="548891"/>
+            <a:off x="1230157" y="554683"/>
             <a:ext cx="371637" cy="371637"/>
           </a:xfrm>
           <a:prstGeom prst="rect">
@@ -5768,7 +5771,7 @@
         </p:nvSpPr>
         <p:spPr>
           <a:xfrm>
-            <a:off x="2188213" y="759806"/>
+            <a:off x="1570527" y="705471"/>
             <a:ext cx="1231380" cy="307777"/>
           </a:xfrm>
           <a:prstGeom prst="rect">

</xml_diff>